<commit_message>
wip: revision of sdf/qpsk_transmitter
</commit_message>
<xml_diff>
--- a/doc/tex/sdf/qpsk_transmitter/figures/qpsk_transmitter.pptx
+++ b/doc/tex/sdf/qpsk_transmitter/figures/qpsk_transmitter.pptx
@@ -8,7 +8,7 @@
     <p:sldId id="256" r:id="rId2"/>
   </p:sldIdLst>
   <p:sldSz cx="12192000" cy="6858000"/>
-  <p:notesSz cx="6858000" cy="9144000"/>
+  <p:notesSz cx="7099300" cy="10234613"/>
   <p:defaultTextStyle>
     <a:defPPr>
       <a:defRPr lang="en-US"/>
@@ -104,6 +104,11 @@
       </a:defRPr>
     </a:lvl9pPr>
   </p:defaultTextStyle>
+  <p:extLst>
+    <p:ext uri="{EFAFB233-063F-42B5-8137-9DF3F51BA10A}">
+      <p15:sldGuideLst xmlns:p15="http://schemas.microsoft.com/office/powerpoint/2012/main"/>
+    </p:ext>
+  </p:extLst>
 </p:presentation>
 </file>
 
@@ -258,7 +263,7 @@
           <a:p>
             <a:fld id="{E6540EF0-5A87-49A6-B462-3DE9320A8287}" type="datetimeFigureOut">
               <a:rPr lang="en-US" smtClean="0"/>
-              <a:t>07-Jul-17</a:t>
+              <a:t>7/7/2017</a:t>
             </a:fld>
             <a:endParaRPr lang="en-US"/>
           </a:p>
@@ -456,7 +461,7 @@
           <a:p>
             <a:fld id="{E6540EF0-5A87-49A6-B462-3DE9320A8287}" type="datetimeFigureOut">
               <a:rPr lang="en-US" smtClean="0"/>
-              <a:t>07-Jul-17</a:t>
+              <a:t>7/7/2017</a:t>
             </a:fld>
             <a:endParaRPr lang="en-US"/>
           </a:p>
@@ -664,7 +669,7 @@
           <a:p>
             <a:fld id="{E6540EF0-5A87-49A6-B462-3DE9320A8287}" type="datetimeFigureOut">
               <a:rPr lang="en-US" smtClean="0"/>
-              <a:t>07-Jul-17</a:t>
+              <a:t>7/7/2017</a:t>
             </a:fld>
             <a:endParaRPr lang="en-US"/>
           </a:p>
@@ -862,7 +867,7 @@
           <a:p>
             <a:fld id="{E6540EF0-5A87-49A6-B462-3DE9320A8287}" type="datetimeFigureOut">
               <a:rPr lang="en-US" smtClean="0"/>
-              <a:t>07-Jul-17</a:t>
+              <a:t>7/7/2017</a:t>
             </a:fld>
             <a:endParaRPr lang="en-US"/>
           </a:p>
@@ -1137,7 +1142,7 @@
           <a:p>
             <a:fld id="{E6540EF0-5A87-49A6-B462-3DE9320A8287}" type="datetimeFigureOut">
               <a:rPr lang="en-US" smtClean="0"/>
-              <a:t>07-Jul-17</a:t>
+              <a:t>7/7/2017</a:t>
             </a:fld>
             <a:endParaRPr lang="en-US"/>
           </a:p>
@@ -1402,7 +1407,7 @@
           <a:p>
             <a:fld id="{E6540EF0-5A87-49A6-B462-3DE9320A8287}" type="datetimeFigureOut">
               <a:rPr lang="en-US" smtClean="0"/>
-              <a:t>07-Jul-17</a:t>
+              <a:t>7/7/2017</a:t>
             </a:fld>
             <a:endParaRPr lang="en-US"/>
           </a:p>
@@ -1814,7 +1819,7 @@
           <a:p>
             <a:fld id="{E6540EF0-5A87-49A6-B462-3DE9320A8287}" type="datetimeFigureOut">
               <a:rPr lang="en-US" smtClean="0"/>
-              <a:t>07-Jul-17</a:t>
+              <a:t>7/7/2017</a:t>
             </a:fld>
             <a:endParaRPr lang="en-US"/>
           </a:p>
@@ -1955,7 +1960,7 @@
           <a:p>
             <a:fld id="{E6540EF0-5A87-49A6-B462-3DE9320A8287}" type="datetimeFigureOut">
               <a:rPr lang="en-US" smtClean="0"/>
-              <a:t>07-Jul-17</a:t>
+              <a:t>7/7/2017</a:t>
             </a:fld>
             <a:endParaRPr lang="en-US"/>
           </a:p>
@@ -2068,7 +2073,7 @@
           <a:p>
             <a:fld id="{E6540EF0-5A87-49A6-B462-3DE9320A8287}" type="datetimeFigureOut">
               <a:rPr lang="en-US" smtClean="0"/>
-              <a:t>07-Jul-17</a:t>
+              <a:t>7/7/2017</a:t>
             </a:fld>
             <a:endParaRPr lang="en-US"/>
           </a:p>
@@ -2379,7 +2384,7 @@
           <a:p>
             <a:fld id="{E6540EF0-5A87-49A6-B462-3DE9320A8287}" type="datetimeFigureOut">
               <a:rPr lang="en-US" smtClean="0"/>
-              <a:t>07-Jul-17</a:t>
+              <a:t>7/7/2017</a:t>
             </a:fld>
             <a:endParaRPr lang="en-US"/>
           </a:p>
@@ -2667,7 +2672,7 @@
           <a:p>
             <a:fld id="{E6540EF0-5A87-49A6-B462-3DE9320A8287}" type="datetimeFigureOut">
               <a:rPr lang="en-US" smtClean="0"/>
-              <a:t>07-Jul-17</a:t>
+              <a:t>7/7/2017</a:t>
             </a:fld>
             <a:endParaRPr lang="en-US"/>
           </a:p>
@@ -2908,7 +2913,7 @@
           <a:p>
             <a:fld id="{E6540EF0-5A87-49A6-B462-3DE9320A8287}" type="datetimeFigureOut">
               <a:rPr lang="en-US" smtClean="0"/>
-              <a:t>07-Jul-17</a:t>
+              <a:t>7/7/2017</a:t>
             </a:fld>
             <a:endParaRPr lang="en-US"/>
           </a:p>
@@ -3339,7 +3344,7 @@
         </p:nvGrpSpPr>
         <p:grpSpPr>
           <a:xfrm>
-            <a:off x="281354" y="2307101"/>
+            <a:off x="167172" y="2307099"/>
             <a:ext cx="1519311" cy="787791"/>
             <a:chOff x="281354" y="2307101"/>
             <a:chExt cx="1519311" cy="787791"/>
@@ -3448,7 +3453,7 @@
         </p:nvGrpSpPr>
         <p:grpSpPr>
           <a:xfrm>
-            <a:off x="281353" y="3528646"/>
+            <a:off x="167171" y="3464221"/>
             <a:ext cx="1519311" cy="787791"/>
             <a:chOff x="281354" y="2307101"/>
             <a:chExt cx="1519311" cy="787791"/>
@@ -3557,7 +3562,7 @@
         </p:nvGrpSpPr>
         <p:grpSpPr>
           <a:xfrm>
-            <a:off x="2220351" y="2321000"/>
+            <a:off x="2238639" y="2307099"/>
             <a:ext cx="1519311" cy="787791"/>
             <a:chOff x="281354" y="2307101"/>
             <a:chExt cx="1519311" cy="787791"/>
@@ -3652,6 +3657,1321 @@
           </p:txBody>
         </p:sp>
       </p:grpSp>
+      <p:grpSp>
+        <p:nvGrpSpPr>
+          <p:cNvPr id="19" name="Group 18">
+            <a:extLst>
+              <a:ext uri="{FF2B5EF4-FFF2-40B4-BE49-F238E27FC236}">
+                <a16:creationId xmlns:a16="http://schemas.microsoft.com/office/drawing/2014/main" id="{A78B980E-E5B8-4504-8173-9CD42351DAFB}"/>
+              </a:ext>
+            </a:extLst>
+          </p:cNvPr>
+          <p:cNvGrpSpPr/>
+          <p:nvPr/>
+        </p:nvGrpSpPr>
+        <p:grpSpPr>
+          <a:xfrm>
+            <a:off x="4289474" y="1721745"/>
+            <a:ext cx="1538771" cy="820595"/>
+            <a:chOff x="261894" y="2300309"/>
+            <a:chExt cx="1538771" cy="820595"/>
+          </a:xfrm>
+        </p:grpSpPr>
+        <p:sp>
+          <p:nvSpPr>
+            <p:cNvPr id="20" name="Rectangle 19">
+              <a:extLst>
+                <a:ext uri="{FF2B5EF4-FFF2-40B4-BE49-F238E27FC236}">
+                  <a16:creationId xmlns:a16="http://schemas.microsoft.com/office/drawing/2014/main" id="{78F90217-9F49-4301-B86C-77BF5ABFD931}"/>
+                </a:ext>
+              </a:extLst>
+            </p:cNvPr>
+            <p:cNvSpPr/>
+            <p:nvPr/>
+          </p:nvSpPr>
+          <p:spPr>
+            <a:xfrm>
+              <a:off x="281354" y="2307101"/>
+              <a:ext cx="1519311" cy="787791"/>
+            </a:xfrm>
+            <a:prstGeom prst="rect">
+              <a:avLst/>
+            </a:prstGeom>
+            <a:noFill/>
+            <a:ln w="22225">
+              <a:solidFill>
+                <a:schemeClr val="tx1"/>
+              </a:solidFill>
+            </a:ln>
+          </p:spPr>
+          <p:style>
+            <a:lnRef idx="2">
+              <a:schemeClr val="accent1">
+                <a:shade val="50000"/>
+              </a:schemeClr>
+            </a:lnRef>
+            <a:fillRef idx="1">
+              <a:schemeClr val="accent1"/>
+            </a:fillRef>
+            <a:effectRef idx="0">
+              <a:schemeClr val="accent1"/>
+            </a:effectRef>
+            <a:fontRef idx="minor">
+              <a:schemeClr val="lt1"/>
+            </a:fontRef>
+          </p:style>
+          <p:txBody>
+            <a:bodyPr rtlCol="0" anchor="ctr"/>
+            <a:lstStyle/>
+            <a:p>
+              <a:pPr algn="ctr"/>
+              <a:endParaRPr lang="en-US" dirty="0"/>
+            </a:p>
+          </p:txBody>
+        </p:sp>
+        <p:sp>
+          <p:nvSpPr>
+            <p:cNvPr id="21" name="TextBox 20">
+              <a:extLst>
+                <a:ext uri="{FF2B5EF4-FFF2-40B4-BE49-F238E27FC236}">
+                  <a16:creationId xmlns:a16="http://schemas.microsoft.com/office/drawing/2014/main" id="{4C471AAA-DEFB-4581-940E-958EAEE7D536}"/>
+                </a:ext>
+              </a:extLst>
+            </p:cNvPr>
+            <p:cNvSpPr txBox="1"/>
+            <p:nvPr/>
+          </p:nvSpPr>
+          <p:spPr>
+            <a:xfrm>
+              <a:off x="261894" y="2300309"/>
+              <a:ext cx="1532089" cy="820595"/>
+            </a:xfrm>
+            <a:prstGeom prst="rect">
+              <a:avLst/>
+            </a:prstGeom>
+            <a:noFill/>
+          </p:spPr>
+          <p:txBody>
+            <a:bodyPr wrap="square" rtlCol="0">
+              <a:normAutofit fontScale="92500" lnSpcReduction="10000"/>
+            </a:bodyPr>
+            <a:lstStyle/>
+            <a:p>
+              <a:pPr algn="ctr"/>
+              <a:r>
+                <a:rPr lang="en-US" dirty="0" smtClean="0"/>
+                <a:t>Discrete </a:t>
+              </a:r>
+              <a:r>
+                <a:rPr lang="en-US" dirty="0" smtClean="0"/>
+                <a:t>to </a:t>
+              </a:r>
+              <a:r>
+                <a:rPr lang="en-US" dirty="0" smtClean="0"/>
+                <a:t>Continuous Time</a:t>
+              </a:r>
+              <a:endParaRPr lang="en-US" dirty="0"/>
+            </a:p>
+          </p:txBody>
+        </p:sp>
+      </p:grpSp>
+      <p:grpSp>
+        <p:nvGrpSpPr>
+          <p:cNvPr id="22" name="Group 21">
+            <a:extLst>
+              <a:ext uri="{FF2B5EF4-FFF2-40B4-BE49-F238E27FC236}">
+                <a16:creationId xmlns:a16="http://schemas.microsoft.com/office/drawing/2014/main" id="{A78B980E-E5B8-4504-8173-9CD42351DAFB}"/>
+              </a:ext>
+            </a:extLst>
+          </p:cNvPr>
+          <p:cNvGrpSpPr/>
+          <p:nvPr/>
+        </p:nvGrpSpPr>
+        <p:grpSpPr>
+          <a:xfrm>
+            <a:off x="4308934" y="2885660"/>
+            <a:ext cx="1519311" cy="787791"/>
+            <a:chOff x="281354" y="2307101"/>
+            <a:chExt cx="1519311" cy="787791"/>
+          </a:xfrm>
+        </p:grpSpPr>
+        <p:sp>
+          <p:nvSpPr>
+            <p:cNvPr id="23" name="Rectangle 22">
+              <a:extLst>
+                <a:ext uri="{FF2B5EF4-FFF2-40B4-BE49-F238E27FC236}">
+                  <a16:creationId xmlns:a16="http://schemas.microsoft.com/office/drawing/2014/main" id="{78F90217-9F49-4301-B86C-77BF5ABFD931}"/>
+                </a:ext>
+              </a:extLst>
+            </p:cNvPr>
+            <p:cNvSpPr/>
+            <p:nvPr/>
+          </p:nvSpPr>
+          <p:spPr>
+            <a:xfrm>
+              <a:off x="281354" y="2307101"/>
+              <a:ext cx="1519311" cy="787791"/>
+            </a:xfrm>
+            <a:prstGeom prst="rect">
+              <a:avLst/>
+            </a:prstGeom>
+            <a:noFill/>
+            <a:ln w="22225">
+              <a:solidFill>
+                <a:schemeClr val="tx1"/>
+              </a:solidFill>
+            </a:ln>
+          </p:spPr>
+          <p:style>
+            <a:lnRef idx="2">
+              <a:schemeClr val="accent1">
+                <a:shade val="50000"/>
+              </a:schemeClr>
+            </a:lnRef>
+            <a:fillRef idx="1">
+              <a:schemeClr val="accent1"/>
+            </a:fillRef>
+            <a:effectRef idx="0">
+              <a:schemeClr val="accent1"/>
+            </a:effectRef>
+            <a:fontRef idx="minor">
+              <a:schemeClr val="lt1"/>
+            </a:fontRef>
+          </p:style>
+          <p:txBody>
+            <a:bodyPr rtlCol="0" anchor="ctr"/>
+            <a:lstStyle/>
+            <a:p>
+              <a:pPr algn="ctr"/>
+              <a:endParaRPr lang="en-US" dirty="0"/>
+            </a:p>
+          </p:txBody>
+        </p:sp>
+        <p:sp>
+          <p:nvSpPr>
+            <p:cNvPr id="24" name="TextBox 23">
+              <a:extLst>
+                <a:ext uri="{FF2B5EF4-FFF2-40B4-BE49-F238E27FC236}">
+                  <a16:creationId xmlns:a16="http://schemas.microsoft.com/office/drawing/2014/main" id="{4C471AAA-DEFB-4581-940E-958EAEE7D536}"/>
+                </a:ext>
+              </a:extLst>
+            </p:cNvPr>
+            <p:cNvSpPr txBox="1"/>
+            <p:nvPr/>
+          </p:nvSpPr>
+          <p:spPr>
+            <a:xfrm>
+              <a:off x="294717" y="2323503"/>
+              <a:ext cx="1492583" cy="771387"/>
+            </a:xfrm>
+            <a:prstGeom prst="rect">
+              <a:avLst/>
+            </a:prstGeom>
+            <a:noFill/>
+          </p:spPr>
+          <p:txBody>
+            <a:bodyPr wrap="square" rtlCol="0">
+              <a:normAutofit fontScale="92500" lnSpcReduction="20000"/>
+            </a:bodyPr>
+            <a:lstStyle/>
+            <a:p>
+              <a:pPr algn="ctr"/>
+              <a:r>
+                <a:rPr lang="en-US" dirty="0"/>
+                <a:t>Discrete </a:t>
+              </a:r>
+              <a:r>
+                <a:rPr lang="en-US" dirty="0" smtClean="0"/>
+                <a:t>to </a:t>
+              </a:r>
+              <a:r>
+                <a:rPr lang="en-US" dirty="0"/>
+                <a:t>Continuous Time</a:t>
+              </a:r>
+            </a:p>
+          </p:txBody>
+        </p:sp>
+      </p:grpSp>
+      <p:grpSp>
+        <p:nvGrpSpPr>
+          <p:cNvPr id="31" name="Group 30">
+            <a:extLst>
+              <a:ext uri="{FF2B5EF4-FFF2-40B4-BE49-F238E27FC236}">
+                <a16:creationId xmlns:a16="http://schemas.microsoft.com/office/drawing/2014/main" id="{A78B980E-E5B8-4504-8173-9CD42351DAFB}"/>
+              </a:ext>
+            </a:extLst>
+          </p:cNvPr>
+          <p:cNvGrpSpPr/>
+          <p:nvPr/>
+        </p:nvGrpSpPr>
+        <p:grpSpPr>
+          <a:xfrm>
+            <a:off x="6381574" y="1728537"/>
+            <a:ext cx="1519311" cy="787791"/>
+            <a:chOff x="281354" y="2307101"/>
+            <a:chExt cx="1519311" cy="787791"/>
+          </a:xfrm>
+        </p:grpSpPr>
+        <p:sp>
+          <p:nvSpPr>
+            <p:cNvPr id="32" name="Rectangle 31">
+              <a:extLst>
+                <a:ext uri="{FF2B5EF4-FFF2-40B4-BE49-F238E27FC236}">
+                  <a16:creationId xmlns:a16="http://schemas.microsoft.com/office/drawing/2014/main" id="{78F90217-9F49-4301-B86C-77BF5ABFD931}"/>
+                </a:ext>
+              </a:extLst>
+            </p:cNvPr>
+            <p:cNvSpPr/>
+            <p:nvPr/>
+          </p:nvSpPr>
+          <p:spPr>
+            <a:xfrm>
+              <a:off x="281354" y="2307101"/>
+              <a:ext cx="1519311" cy="787791"/>
+            </a:xfrm>
+            <a:prstGeom prst="rect">
+              <a:avLst/>
+            </a:prstGeom>
+            <a:noFill/>
+            <a:ln w="22225">
+              <a:solidFill>
+                <a:schemeClr val="tx1"/>
+              </a:solidFill>
+            </a:ln>
+          </p:spPr>
+          <p:style>
+            <a:lnRef idx="2">
+              <a:schemeClr val="accent1">
+                <a:shade val="50000"/>
+              </a:schemeClr>
+            </a:lnRef>
+            <a:fillRef idx="1">
+              <a:schemeClr val="accent1"/>
+            </a:fillRef>
+            <a:effectRef idx="0">
+              <a:schemeClr val="accent1"/>
+            </a:effectRef>
+            <a:fontRef idx="minor">
+              <a:schemeClr val="lt1"/>
+            </a:fontRef>
+          </p:style>
+          <p:txBody>
+            <a:bodyPr rtlCol="0" anchor="ctr"/>
+            <a:lstStyle/>
+            <a:p>
+              <a:pPr algn="ctr"/>
+              <a:endParaRPr lang="en-US" dirty="0"/>
+            </a:p>
+          </p:txBody>
+        </p:sp>
+        <p:sp>
+          <p:nvSpPr>
+            <p:cNvPr id="33" name="TextBox 32">
+              <a:extLst>
+                <a:ext uri="{FF2B5EF4-FFF2-40B4-BE49-F238E27FC236}">
+                  <a16:creationId xmlns:a16="http://schemas.microsoft.com/office/drawing/2014/main" id="{4C471AAA-DEFB-4581-940E-958EAEE7D536}"/>
+                </a:ext>
+              </a:extLst>
+            </p:cNvPr>
+            <p:cNvSpPr txBox="1"/>
+            <p:nvPr/>
+          </p:nvSpPr>
+          <p:spPr>
+            <a:xfrm>
+              <a:off x="457200" y="2516330"/>
+              <a:ext cx="1167618" cy="369332"/>
+            </a:xfrm>
+            <a:prstGeom prst="rect">
+              <a:avLst/>
+            </a:prstGeom>
+            <a:noFill/>
+          </p:spPr>
+          <p:txBody>
+            <a:bodyPr wrap="square" rtlCol="0">
+              <a:spAutoFit/>
+            </a:bodyPr>
+            <a:lstStyle/>
+            <a:p>
+              <a:pPr algn="ctr"/>
+              <a:r>
+                <a:rPr lang="en-US" dirty="0" smtClean="0"/>
+                <a:t>Filter</a:t>
+              </a:r>
+              <a:endParaRPr lang="en-US" dirty="0"/>
+            </a:p>
+          </p:txBody>
+        </p:sp>
+      </p:grpSp>
+      <p:grpSp>
+        <p:nvGrpSpPr>
+          <p:cNvPr id="34" name="Group 33">
+            <a:extLst>
+              <a:ext uri="{FF2B5EF4-FFF2-40B4-BE49-F238E27FC236}">
+                <a16:creationId xmlns:a16="http://schemas.microsoft.com/office/drawing/2014/main" id="{A78B980E-E5B8-4504-8173-9CD42351DAFB}"/>
+              </a:ext>
+            </a:extLst>
+          </p:cNvPr>
+          <p:cNvGrpSpPr/>
+          <p:nvPr/>
+        </p:nvGrpSpPr>
+        <p:grpSpPr>
+          <a:xfrm>
+            <a:off x="6381574" y="2885660"/>
+            <a:ext cx="1519311" cy="787791"/>
+            <a:chOff x="281354" y="2307101"/>
+            <a:chExt cx="1519311" cy="787791"/>
+          </a:xfrm>
+        </p:grpSpPr>
+        <p:sp>
+          <p:nvSpPr>
+            <p:cNvPr id="35" name="Rectangle 34">
+              <a:extLst>
+                <a:ext uri="{FF2B5EF4-FFF2-40B4-BE49-F238E27FC236}">
+                  <a16:creationId xmlns:a16="http://schemas.microsoft.com/office/drawing/2014/main" id="{78F90217-9F49-4301-B86C-77BF5ABFD931}"/>
+                </a:ext>
+              </a:extLst>
+            </p:cNvPr>
+            <p:cNvSpPr/>
+            <p:nvPr/>
+          </p:nvSpPr>
+          <p:spPr>
+            <a:xfrm>
+              <a:off x="281354" y="2307101"/>
+              <a:ext cx="1519311" cy="787791"/>
+            </a:xfrm>
+            <a:prstGeom prst="rect">
+              <a:avLst/>
+            </a:prstGeom>
+            <a:noFill/>
+            <a:ln w="22225">
+              <a:solidFill>
+                <a:schemeClr val="tx1"/>
+              </a:solidFill>
+            </a:ln>
+          </p:spPr>
+          <p:style>
+            <a:lnRef idx="2">
+              <a:schemeClr val="accent1">
+                <a:shade val="50000"/>
+              </a:schemeClr>
+            </a:lnRef>
+            <a:fillRef idx="1">
+              <a:schemeClr val="accent1"/>
+            </a:fillRef>
+            <a:effectRef idx="0">
+              <a:schemeClr val="accent1"/>
+            </a:effectRef>
+            <a:fontRef idx="minor">
+              <a:schemeClr val="lt1"/>
+            </a:fontRef>
+          </p:style>
+          <p:txBody>
+            <a:bodyPr rtlCol="0" anchor="ctr"/>
+            <a:lstStyle/>
+            <a:p>
+              <a:pPr algn="ctr"/>
+              <a:endParaRPr lang="en-US" dirty="0"/>
+            </a:p>
+          </p:txBody>
+        </p:sp>
+        <p:sp>
+          <p:nvSpPr>
+            <p:cNvPr id="36" name="TextBox 35">
+              <a:extLst>
+                <a:ext uri="{FF2B5EF4-FFF2-40B4-BE49-F238E27FC236}">
+                  <a16:creationId xmlns:a16="http://schemas.microsoft.com/office/drawing/2014/main" id="{4C471AAA-DEFB-4581-940E-958EAEE7D536}"/>
+                </a:ext>
+              </a:extLst>
+            </p:cNvPr>
+            <p:cNvSpPr txBox="1"/>
+            <p:nvPr/>
+          </p:nvSpPr>
+          <p:spPr>
+            <a:xfrm>
+              <a:off x="457200" y="2516330"/>
+              <a:ext cx="1167618" cy="369332"/>
+            </a:xfrm>
+            <a:prstGeom prst="rect">
+              <a:avLst/>
+            </a:prstGeom>
+            <a:noFill/>
+          </p:spPr>
+          <p:txBody>
+            <a:bodyPr wrap="square" rtlCol="0">
+              <a:spAutoFit/>
+            </a:bodyPr>
+            <a:lstStyle/>
+            <a:p>
+              <a:pPr algn="ctr"/>
+              <a:r>
+                <a:rPr lang="en-US" dirty="0" smtClean="0"/>
+                <a:t>Filter</a:t>
+              </a:r>
+              <a:endParaRPr lang="en-US" dirty="0"/>
+            </a:p>
+          </p:txBody>
+        </p:sp>
+      </p:grpSp>
+      <p:grpSp>
+        <p:nvGrpSpPr>
+          <p:cNvPr id="37" name="Group 36">
+            <a:extLst>
+              <a:ext uri="{FF2B5EF4-FFF2-40B4-BE49-F238E27FC236}">
+                <a16:creationId xmlns:a16="http://schemas.microsoft.com/office/drawing/2014/main" id="{A78B980E-E5B8-4504-8173-9CD42351DAFB}"/>
+              </a:ext>
+            </a:extLst>
+          </p:cNvPr>
+          <p:cNvGrpSpPr/>
+          <p:nvPr/>
+        </p:nvGrpSpPr>
+        <p:grpSpPr>
+          <a:xfrm>
+            <a:off x="8454214" y="2323501"/>
+            <a:ext cx="1519311" cy="813765"/>
+            <a:chOff x="281354" y="2307101"/>
+            <a:chExt cx="1519311" cy="813765"/>
+          </a:xfrm>
+        </p:grpSpPr>
+        <p:sp>
+          <p:nvSpPr>
+            <p:cNvPr id="38" name="Rectangle 37">
+              <a:extLst>
+                <a:ext uri="{FF2B5EF4-FFF2-40B4-BE49-F238E27FC236}">
+                  <a16:creationId xmlns:a16="http://schemas.microsoft.com/office/drawing/2014/main" id="{78F90217-9F49-4301-B86C-77BF5ABFD931}"/>
+                </a:ext>
+              </a:extLst>
+            </p:cNvPr>
+            <p:cNvSpPr/>
+            <p:nvPr/>
+          </p:nvSpPr>
+          <p:spPr>
+            <a:xfrm>
+              <a:off x="281354" y="2307101"/>
+              <a:ext cx="1519311" cy="787791"/>
+            </a:xfrm>
+            <a:prstGeom prst="rect">
+              <a:avLst/>
+            </a:prstGeom>
+            <a:noFill/>
+            <a:ln w="22225">
+              <a:solidFill>
+                <a:schemeClr val="tx1"/>
+              </a:solidFill>
+            </a:ln>
+          </p:spPr>
+          <p:style>
+            <a:lnRef idx="2">
+              <a:schemeClr val="accent1">
+                <a:shade val="50000"/>
+              </a:schemeClr>
+            </a:lnRef>
+            <a:fillRef idx="1">
+              <a:schemeClr val="accent1"/>
+            </a:fillRef>
+            <a:effectRef idx="0">
+              <a:schemeClr val="accent1"/>
+            </a:effectRef>
+            <a:fontRef idx="minor">
+              <a:schemeClr val="lt1"/>
+            </a:fontRef>
+          </p:style>
+          <p:txBody>
+            <a:bodyPr rtlCol="0" anchor="ctr"/>
+            <a:lstStyle/>
+            <a:p>
+              <a:pPr algn="ctr"/>
+              <a:endParaRPr lang="en-US" dirty="0"/>
+            </a:p>
+          </p:txBody>
+        </p:sp>
+        <p:sp>
+          <p:nvSpPr>
+            <p:cNvPr id="39" name="TextBox 38">
+              <a:extLst>
+                <a:ext uri="{FF2B5EF4-FFF2-40B4-BE49-F238E27FC236}">
+                  <a16:creationId xmlns:a16="http://schemas.microsoft.com/office/drawing/2014/main" id="{4C471AAA-DEFB-4581-940E-958EAEE7D536}"/>
+                </a:ext>
+              </a:extLst>
+            </p:cNvPr>
+            <p:cNvSpPr txBox="1"/>
+            <p:nvPr/>
+          </p:nvSpPr>
+          <p:spPr>
+            <a:xfrm>
+              <a:off x="458372" y="2374042"/>
+              <a:ext cx="1167618" cy="746824"/>
+            </a:xfrm>
+            <a:prstGeom prst="rect">
+              <a:avLst/>
+            </a:prstGeom>
+            <a:noFill/>
+          </p:spPr>
+          <p:txBody>
+            <a:bodyPr wrap="square" rtlCol="0">
+              <a:normAutofit fontScale="92500"/>
+            </a:bodyPr>
+            <a:lstStyle/>
+            <a:p>
+              <a:pPr algn="ctr"/>
+              <a:r>
+                <a:rPr lang="en-US" dirty="0" smtClean="0"/>
+                <a:t>IQ Modulator</a:t>
+              </a:r>
+              <a:endParaRPr lang="en-US" dirty="0"/>
+            </a:p>
+          </p:txBody>
+        </p:sp>
+      </p:grpSp>
+      <p:grpSp>
+        <p:nvGrpSpPr>
+          <p:cNvPr id="40" name="Group 39">
+            <a:extLst>
+              <a:ext uri="{FF2B5EF4-FFF2-40B4-BE49-F238E27FC236}">
+                <a16:creationId xmlns:a16="http://schemas.microsoft.com/office/drawing/2014/main" id="{A78B980E-E5B8-4504-8173-9CD42351DAFB}"/>
+              </a:ext>
+            </a:extLst>
+          </p:cNvPr>
+          <p:cNvGrpSpPr/>
+          <p:nvPr/>
+        </p:nvGrpSpPr>
+        <p:grpSpPr>
+          <a:xfrm>
+            <a:off x="10524509" y="2313101"/>
+            <a:ext cx="1519311" cy="787791"/>
+            <a:chOff x="281354" y="2307101"/>
+            <a:chExt cx="1519311" cy="787791"/>
+          </a:xfrm>
+        </p:grpSpPr>
+        <p:sp>
+          <p:nvSpPr>
+            <p:cNvPr id="41" name="Rectangle 40">
+              <a:extLst>
+                <a:ext uri="{FF2B5EF4-FFF2-40B4-BE49-F238E27FC236}">
+                  <a16:creationId xmlns:a16="http://schemas.microsoft.com/office/drawing/2014/main" id="{78F90217-9F49-4301-B86C-77BF5ABFD931}"/>
+                </a:ext>
+              </a:extLst>
+            </p:cNvPr>
+            <p:cNvSpPr/>
+            <p:nvPr/>
+          </p:nvSpPr>
+          <p:spPr>
+            <a:xfrm>
+              <a:off x="281354" y="2307101"/>
+              <a:ext cx="1519311" cy="787791"/>
+            </a:xfrm>
+            <a:prstGeom prst="rect">
+              <a:avLst/>
+            </a:prstGeom>
+            <a:noFill/>
+            <a:ln w="22225">
+              <a:solidFill>
+                <a:schemeClr val="tx1"/>
+              </a:solidFill>
+            </a:ln>
+          </p:spPr>
+          <p:style>
+            <a:lnRef idx="2">
+              <a:schemeClr val="accent1">
+                <a:shade val="50000"/>
+              </a:schemeClr>
+            </a:lnRef>
+            <a:fillRef idx="1">
+              <a:schemeClr val="accent1"/>
+            </a:fillRef>
+            <a:effectRef idx="0">
+              <a:schemeClr val="accent1"/>
+            </a:effectRef>
+            <a:fontRef idx="minor">
+              <a:schemeClr val="lt1"/>
+            </a:fontRef>
+          </p:style>
+          <p:txBody>
+            <a:bodyPr rtlCol="0" anchor="ctr"/>
+            <a:lstStyle/>
+            <a:p>
+              <a:pPr algn="ctr"/>
+              <a:endParaRPr lang="en-US" dirty="0"/>
+            </a:p>
+          </p:txBody>
+        </p:sp>
+        <p:sp>
+          <p:nvSpPr>
+            <p:cNvPr id="42" name="TextBox 41">
+              <a:extLst>
+                <a:ext uri="{FF2B5EF4-FFF2-40B4-BE49-F238E27FC236}">
+                  <a16:creationId xmlns:a16="http://schemas.microsoft.com/office/drawing/2014/main" id="{4C471AAA-DEFB-4581-940E-958EAEE7D536}"/>
+                </a:ext>
+              </a:extLst>
+            </p:cNvPr>
+            <p:cNvSpPr txBox="1"/>
+            <p:nvPr/>
+          </p:nvSpPr>
+          <p:spPr>
+            <a:xfrm>
+              <a:off x="457200" y="2516330"/>
+              <a:ext cx="1167618" cy="369332"/>
+            </a:xfrm>
+            <a:prstGeom prst="rect">
+              <a:avLst/>
+            </a:prstGeom>
+            <a:noFill/>
+          </p:spPr>
+          <p:txBody>
+            <a:bodyPr wrap="square" rtlCol="0">
+              <a:spAutoFit/>
+            </a:bodyPr>
+            <a:lstStyle/>
+            <a:p>
+              <a:pPr algn="ctr"/>
+              <a:r>
+                <a:rPr lang="en-US" dirty="0" smtClean="0"/>
+                <a:t>Sink</a:t>
+              </a:r>
+              <a:endParaRPr lang="en-US" dirty="0"/>
+            </a:p>
+          </p:txBody>
+        </p:sp>
+      </p:grpSp>
+      <p:cxnSp>
+        <p:nvCxnSpPr>
+          <p:cNvPr id="3" name="Straight Arrow Connector 2"/>
+          <p:cNvCxnSpPr>
+            <a:stCxn id="10" idx="2"/>
+            <a:endCxn id="14" idx="0"/>
+          </p:cNvCxnSpPr>
+          <p:nvPr/>
+        </p:nvCxnSpPr>
+        <p:spPr>
+          <a:xfrm flipH="1">
+            <a:off x="926827" y="3094890"/>
+            <a:ext cx="1" cy="369331"/>
+          </a:xfrm>
+          <a:prstGeom prst="straightConnector1">
+            <a:avLst/>
+          </a:prstGeom>
+          <a:ln>
+            <a:tailEnd type="triangle"/>
+          </a:ln>
+        </p:spPr>
+        <p:style>
+          <a:lnRef idx="1">
+            <a:schemeClr val="dk1"/>
+          </a:lnRef>
+          <a:fillRef idx="0">
+            <a:schemeClr val="dk1"/>
+          </a:fillRef>
+          <a:effectRef idx="0">
+            <a:schemeClr val="dk1"/>
+          </a:effectRef>
+          <a:fontRef idx="minor">
+            <a:schemeClr val="tx1"/>
+          </a:fontRef>
+        </p:style>
+      </p:cxnSp>
+      <p:cxnSp>
+        <p:nvCxnSpPr>
+          <p:cNvPr id="43" name="Straight Arrow Connector 42"/>
+          <p:cNvCxnSpPr>
+            <a:stCxn id="10" idx="3"/>
+            <a:endCxn id="17" idx="1"/>
+          </p:cNvCxnSpPr>
+          <p:nvPr/>
+        </p:nvCxnSpPr>
+        <p:spPr>
+          <a:xfrm>
+            <a:off x="1686483" y="2700995"/>
+            <a:ext cx="552156" cy="0"/>
+          </a:xfrm>
+          <a:prstGeom prst="straightConnector1">
+            <a:avLst/>
+          </a:prstGeom>
+          <a:ln>
+            <a:tailEnd type="triangle"/>
+          </a:ln>
+        </p:spPr>
+        <p:style>
+          <a:lnRef idx="1">
+            <a:schemeClr val="dk1"/>
+          </a:lnRef>
+          <a:fillRef idx="0">
+            <a:schemeClr val="dk1"/>
+          </a:fillRef>
+          <a:effectRef idx="0">
+            <a:schemeClr val="dk1"/>
+          </a:effectRef>
+          <a:fontRef idx="minor">
+            <a:schemeClr val="tx1"/>
+          </a:fontRef>
+        </p:style>
+      </p:cxnSp>
+      <p:cxnSp>
+        <p:nvCxnSpPr>
+          <p:cNvPr id="45" name="Straight Arrow Connector 44"/>
+          <p:cNvCxnSpPr/>
+          <p:nvPr/>
+        </p:nvCxnSpPr>
+        <p:spPr>
+          <a:xfrm>
+            <a:off x="5829418" y="2132043"/>
+            <a:ext cx="552156" cy="0"/>
+          </a:xfrm>
+          <a:prstGeom prst="straightConnector1">
+            <a:avLst/>
+          </a:prstGeom>
+          <a:ln>
+            <a:tailEnd type="triangle"/>
+          </a:ln>
+        </p:spPr>
+        <p:style>
+          <a:lnRef idx="1">
+            <a:schemeClr val="dk1"/>
+          </a:lnRef>
+          <a:fillRef idx="0">
+            <a:schemeClr val="dk1"/>
+          </a:fillRef>
+          <a:effectRef idx="0">
+            <a:schemeClr val="dk1"/>
+          </a:effectRef>
+          <a:fontRef idx="minor">
+            <a:schemeClr val="tx1"/>
+          </a:fontRef>
+        </p:style>
+      </p:cxnSp>
+      <p:cxnSp>
+        <p:nvCxnSpPr>
+          <p:cNvPr id="46" name="Straight Arrow Connector 45"/>
+          <p:cNvCxnSpPr/>
+          <p:nvPr/>
+        </p:nvCxnSpPr>
+        <p:spPr>
+          <a:xfrm>
+            <a:off x="5829418" y="3279555"/>
+            <a:ext cx="552156" cy="0"/>
+          </a:xfrm>
+          <a:prstGeom prst="straightConnector1">
+            <a:avLst/>
+          </a:prstGeom>
+          <a:ln>
+            <a:tailEnd type="triangle"/>
+          </a:ln>
+        </p:spPr>
+        <p:style>
+          <a:lnRef idx="1">
+            <a:schemeClr val="dk1"/>
+          </a:lnRef>
+          <a:fillRef idx="0">
+            <a:schemeClr val="dk1"/>
+          </a:fillRef>
+          <a:effectRef idx="0">
+            <a:schemeClr val="dk1"/>
+          </a:effectRef>
+          <a:fontRef idx="minor">
+            <a:schemeClr val="tx1"/>
+          </a:fontRef>
+        </p:style>
+      </p:cxnSp>
+      <p:cxnSp>
+        <p:nvCxnSpPr>
+          <p:cNvPr id="47" name="Straight Arrow Connector 46"/>
+          <p:cNvCxnSpPr/>
+          <p:nvPr/>
+        </p:nvCxnSpPr>
+        <p:spPr>
+          <a:xfrm>
+            <a:off x="9973525" y="2700993"/>
+            <a:ext cx="552156" cy="0"/>
+          </a:xfrm>
+          <a:prstGeom prst="straightConnector1">
+            <a:avLst/>
+          </a:prstGeom>
+          <a:ln>
+            <a:tailEnd type="triangle"/>
+          </a:ln>
+        </p:spPr>
+        <p:style>
+          <a:lnRef idx="1">
+            <a:schemeClr val="dk1"/>
+          </a:lnRef>
+          <a:fillRef idx="0">
+            <a:schemeClr val="dk1"/>
+          </a:fillRef>
+          <a:effectRef idx="0">
+            <a:schemeClr val="dk1"/>
+          </a:effectRef>
+          <a:fontRef idx="minor">
+            <a:schemeClr val="tx1"/>
+          </a:fontRef>
+        </p:style>
+      </p:cxnSp>
+      <p:cxnSp>
+        <p:nvCxnSpPr>
+          <p:cNvPr id="49" name="Elbow Connector 48"/>
+          <p:cNvCxnSpPr>
+            <a:endCxn id="23" idx="1"/>
+          </p:cNvCxnSpPr>
+          <p:nvPr/>
+        </p:nvCxnSpPr>
+        <p:spPr>
+          <a:xfrm>
+            <a:off x="3744586" y="2885660"/>
+            <a:ext cx="564348" cy="393896"/>
+          </a:xfrm>
+          <a:prstGeom prst="bentConnector3">
+            <a:avLst/>
+          </a:prstGeom>
+          <a:ln>
+            <a:tailEnd type="triangle"/>
+          </a:ln>
+        </p:spPr>
+        <p:style>
+          <a:lnRef idx="1">
+            <a:schemeClr val="dk1"/>
+          </a:lnRef>
+          <a:fillRef idx="0">
+            <a:schemeClr val="dk1"/>
+          </a:fillRef>
+          <a:effectRef idx="0">
+            <a:schemeClr val="dk1"/>
+          </a:effectRef>
+          <a:fontRef idx="minor">
+            <a:schemeClr val="tx1"/>
+          </a:fontRef>
+        </p:style>
+      </p:cxnSp>
+      <p:cxnSp>
+        <p:nvCxnSpPr>
+          <p:cNvPr id="51" name="Elbow Connector 50"/>
+          <p:cNvCxnSpPr>
+            <a:endCxn id="20" idx="1"/>
+          </p:cNvCxnSpPr>
+          <p:nvPr/>
+        </p:nvCxnSpPr>
+        <p:spPr>
+          <a:xfrm flipV="1">
+            <a:off x="3777410" y="2122433"/>
+            <a:ext cx="531524" cy="410297"/>
+          </a:xfrm>
+          <a:prstGeom prst="bentConnector3">
+            <a:avLst/>
+          </a:prstGeom>
+          <a:ln>
+            <a:tailEnd type="triangle"/>
+          </a:ln>
+        </p:spPr>
+        <p:style>
+          <a:lnRef idx="1">
+            <a:schemeClr val="dk1"/>
+          </a:lnRef>
+          <a:fillRef idx="0">
+            <a:schemeClr val="dk1"/>
+          </a:fillRef>
+          <a:effectRef idx="0">
+            <a:schemeClr val="dk1"/>
+          </a:effectRef>
+          <a:fontRef idx="minor">
+            <a:schemeClr val="tx1"/>
+          </a:fontRef>
+        </p:style>
+      </p:cxnSp>
+      <p:cxnSp>
+        <p:nvCxnSpPr>
+          <p:cNvPr id="53" name="Elbow Connector 52"/>
+          <p:cNvCxnSpPr/>
+          <p:nvPr/>
+        </p:nvCxnSpPr>
+        <p:spPr>
+          <a:xfrm flipV="1">
+            <a:off x="7895376" y="2902062"/>
+            <a:ext cx="555321" cy="377492"/>
+          </a:xfrm>
+          <a:prstGeom prst="bentConnector3">
+            <a:avLst/>
+          </a:prstGeom>
+          <a:ln>
+            <a:tailEnd type="triangle"/>
+          </a:ln>
+        </p:spPr>
+        <p:style>
+          <a:lnRef idx="1">
+            <a:schemeClr val="dk1"/>
+          </a:lnRef>
+          <a:fillRef idx="0">
+            <a:schemeClr val="dk1"/>
+          </a:fillRef>
+          <a:effectRef idx="0">
+            <a:schemeClr val="dk1"/>
+          </a:effectRef>
+          <a:fontRef idx="minor">
+            <a:schemeClr val="tx1"/>
+          </a:fontRef>
+        </p:style>
+      </p:cxnSp>
+      <p:cxnSp>
+        <p:nvCxnSpPr>
+          <p:cNvPr id="55" name="Elbow Connector 54"/>
+          <p:cNvCxnSpPr/>
+          <p:nvPr/>
+        </p:nvCxnSpPr>
+        <p:spPr>
+          <a:xfrm>
+            <a:off x="7895376" y="2122433"/>
+            <a:ext cx="555321" cy="410297"/>
+          </a:xfrm>
+          <a:prstGeom prst="bentConnector3">
+            <a:avLst/>
+          </a:prstGeom>
+          <a:ln>
+            <a:tailEnd type="triangle"/>
+          </a:ln>
+        </p:spPr>
+        <p:style>
+          <a:lnRef idx="1">
+            <a:schemeClr val="dk1"/>
+          </a:lnRef>
+          <a:fillRef idx="0">
+            <a:schemeClr val="dk1"/>
+          </a:fillRef>
+          <a:effectRef idx="0">
+            <a:schemeClr val="dk1"/>
+          </a:effectRef>
+          <a:fontRef idx="minor">
+            <a:schemeClr val="tx1"/>
+          </a:fontRef>
+        </p:style>
+      </p:cxnSp>
+      <p:sp>
+        <p:nvSpPr>
+          <p:cNvPr id="57" name="TextBox 56">
+            <a:extLst>
+              <a:ext uri="{FF2B5EF4-FFF2-40B4-BE49-F238E27FC236}">
+                <a16:creationId xmlns:a16="http://schemas.microsoft.com/office/drawing/2014/main" id="{161AB891-1A8A-46AB-8B66-527F5F79E84C}"/>
+              </a:ext>
+            </a:extLst>
+          </p:cNvPr>
+          <p:cNvSpPr txBox="1"/>
+          <p:nvPr/>
+        </p:nvSpPr>
+        <p:spPr>
+          <a:xfrm>
+            <a:off x="1378752" y="2390442"/>
+            <a:ext cx="1167618" cy="369332"/>
+          </a:xfrm>
+          <a:prstGeom prst="rect">
+            <a:avLst/>
+          </a:prstGeom>
+          <a:noFill/>
+        </p:spPr>
+        <p:txBody>
+          <a:bodyPr wrap="square" rtlCol="0">
+            <a:spAutoFit/>
+          </a:bodyPr>
+          <a:lstStyle/>
+          <a:p>
+            <a:pPr algn="ctr"/>
+            <a:r>
+              <a:rPr lang="en-US" dirty="0" smtClean="0"/>
+              <a:t>S1</a:t>
+            </a:r>
+            <a:endParaRPr lang="en-US" dirty="0"/>
+          </a:p>
+        </p:txBody>
+      </p:sp>
+      <p:sp>
+        <p:nvSpPr>
+          <p:cNvPr id="58" name="TextBox 57">
+            <a:extLst>
+              <a:ext uri="{FF2B5EF4-FFF2-40B4-BE49-F238E27FC236}">
+                <a16:creationId xmlns:a16="http://schemas.microsoft.com/office/drawing/2014/main" id="{161AB891-1A8A-46AB-8B66-527F5F79E84C}"/>
+              </a:ext>
+            </a:extLst>
+          </p:cNvPr>
+          <p:cNvSpPr txBox="1"/>
+          <p:nvPr/>
+        </p:nvSpPr>
+        <p:spPr>
+          <a:xfrm>
+            <a:off x="3448461" y="1769503"/>
+            <a:ext cx="1167618" cy="369332"/>
+          </a:xfrm>
+          <a:prstGeom prst="rect">
+            <a:avLst/>
+          </a:prstGeom>
+          <a:noFill/>
+        </p:spPr>
+        <p:txBody>
+          <a:bodyPr wrap="square" rtlCol="0">
+            <a:spAutoFit/>
+          </a:bodyPr>
+          <a:lstStyle/>
+          <a:p>
+            <a:pPr algn="ctr"/>
+            <a:r>
+              <a:rPr lang="en-US" dirty="0" smtClean="0"/>
+              <a:t>S2</a:t>
+            </a:r>
+            <a:endParaRPr lang="en-US" dirty="0"/>
+          </a:p>
+        </p:txBody>
+      </p:sp>
+      <p:sp>
+        <p:nvSpPr>
+          <p:cNvPr id="59" name="TextBox 58">
+            <a:extLst>
+              <a:ext uri="{FF2B5EF4-FFF2-40B4-BE49-F238E27FC236}">
+                <a16:creationId xmlns:a16="http://schemas.microsoft.com/office/drawing/2014/main" id="{161AB891-1A8A-46AB-8B66-527F5F79E84C}"/>
+              </a:ext>
+            </a:extLst>
+          </p:cNvPr>
+          <p:cNvSpPr txBox="1"/>
+          <p:nvPr/>
+        </p:nvSpPr>
+        <p:spPr>
+          <a:xfrm>
+            <a:off x="3448461" y="3336102"/>
+            <a:ext cx="1167618" cy="369332"/>
+          </a:xfrm>
+          <a:prstGeom prst="rect">
+            <a:avLst/>
+          </a:prstGeom>
+          <a:noFill/>
+        </p:spPr>
+        <p:txBody>
+          <a:bodyPr wrap="square" rtlCol="0">
+            <a:spAutoFit/>
+          </a:bodyPr>
+          <a:lstStyle/>
+          <a:p>
+            <a:pPr algn="ctr"/>
+            <a:r>
+              <a:rPr lang="en-US" dirty="0" smtClean="0"/>
+              <a:t>S3</a:t>
+            </a:r>
+            <a:endParaRPr lang="en-US" dirty="0"/>
+          </a:p>
+        </p:txBody>
+      </p:sp>
+      <p:sp>
+        <p:nvSpPr>
+          <p:cNvPr id="60" name="TextBox 59">
+            <a:extLst>
+              <a:ext uri="{FF2B5EF4-FFF2-40B4-BE49-F238E27FC236}">
+                <a16:creationId xmlns:a16="http://schemas.microsoft.com/office/drawing/2014/main" id="{161AB891-1A8A-46AB-8B66-527F5F79E84C}"/>
+              </a:ext>
+            </a:extLst>
+          </p:cNvPr>
+          <p:cNvSpPr txBox="1"/>
+          <p:nvPr/>
+        </p:nvSpPr>
+        <p:spPr>
+          <a:xfrm>
+            <a:off x="5526763" y="1753098"/>
+            <a:ext cx="1167618" cy="369332"/>
+          </a:xfrm>
+          <a:prstGeom prst="rect">
+            <a:avLst/>
+          </a:prstGeom>
+          <a:noFill/>
+        </p:spPr>
+        <p:txBody>
+          <a:bodyPr wrap="square" rtlCol="0">
+            <a:spAutoFit/>
+          </a:bodyPr>
+          <a:lstStyle/>
+          <a:p>
+            <a:pPr algn="ctr"/>
+            <a:r>
+              <a:rPr lang="en-US" dirty="0" smtClean="0"/>
+              <a:t>S4</a:t>
+            </a:r>
+            <a:endParaRPr lang="en-US" dirty="0"/>
+          </a:p>
+        </p:txBody>
+      </p:sp>
+      <p:sp>
+        <p:nvSpPr>
+          <p:cNvPr id="61" name="TextBox 60">
+            <a:extLst>
+              <a:ext uri="{FF2B5EF4-FFF2-40B4-BE49-F238E27FC236}">
+                <a16:creationId xmlns:a16="http://schemas.microsoft.com/office/drawing/2014/main" id="{161AB891-1A8A-46AB-8B66-527F5F79E84C}"/>
+              </a:ext>
+            </a:extLst>
+          </p:cNvPr>
+          <p:cNvSpPr txBox="1"/>
+          <p:nvPr/>
+        </p:nvSpPr>
+        <p:spPr>
+          <a:xfrm>
+            <a:off x="5519342" y="3314206"/>
+            <a:ext cx="1167618" cy="369332"/>
+          </a:xfrm>
+          <a:prstGeom prst="rect">
+            <a:avLst/>
+          </a:prstGeom>
+          <a:noFill/>
+        </p:spPr>
+        <p:txBody>
+          <a:bodyPr wrap="square" rtlCol="0">
+            <a:spAutoFit/>
+          </a:bodyPr>
+          <a:lstStyle/>
+          <a:p>
+            <a:pPr algn="ctr"/>
+            <a:r>
+              <a:rPr lang="en-US" dirty="0" smtClean="0"/>
+              <a:t>S5</a:t>
+            </a:r>
+            <a:endParaRPr lang="en-US" dirty="0"/>
+          </a:p>
+        </p:txBody>
+      </p:sp>
+      <p:sp>
+        <p:nvSpPr>
+          <p:cNvPr id="62" name="TextBox 61">
+            <a:extLst>
+              <a:ext uri="{FF2B5EF4-FFF2-40B4-BE49-F238E27FC236}">
+                <a16:creationId xmlns:a16="http://schemas.microsoft.com/office/drawing/2014/main" id="{161AB891-1A8A-46AB-8B66-527F5F79E84C}"/>
+              </a:ext>
+            </a:extLst>
+          </p:cNvPr>
+          <p:cNvSpPr txBox="1"/>
+          <p:nvPr/>
+        </p:nvSpPr>
+        <p:spPr>
+          <a:xfrm>
+            <a:off x="7589227" y="1743014"/>
+            <a:ext cx="1167618" cy="369332"/>
+          </a:xfrm>
+          <a:prstGeom prst="rect">
+            <a:avLst/>
+          </a:prstGeom>
+          <a:noFill/>
+        </p:spPr>
+        <p:txBody>
+          <a:bodyPr wrap="square" rtlCol="0">
+            <a:spAutoFit/>
+          </a:bodyPr>
+          <a:lstStyle/>
+          <a:p>
+            <a:pPr algn="ctr"/>
+            <a:r>
+              <a:rPr lang="en-US" dirty="0" smtClean="0"/>
+              <a:t>S6</a:t>
+            </a:r>
+            <a:endParaRPr lang="en-US" dirty="0"/>
+          </a:p>
+        </p:txBody>
+      </p:sp>
+      <p:sp>
+        <p:nvSpPr>
+          <p:cNvPr id="63" name="TextBox 62">
+            <a:extLst>
+              <a:ext uri="{FF2B5EF4-FFF2-40B4-BE49-F238E27FC236}">
+                <a16:creationId xmlns:a16="http://schemas.microsoft.com/office/drawing/2014/main" id="{161AB891-1A8A-46AB-8B66-527F5F79E84C}"/>
+              </a:ext>
+            </a:extLst>
+          </p:cNvPr>
+          <p:cNvSpPr txBox="1"/>
+          <p:nvPr/>
+        </p:nvSpPr>
+        <p:spPr>
+          <a:xfrm>
+            <a:off x="7589227" y="3295958"/>
+            <a:ext cx="1167618" cy="369332"/>
+          </a:xfrm>
+          <a:prstGeom prst="rect">
+            <a:avLst/>
+          </a:prstGeom>
+          <a:noFill/>
+        </p:spPr>
+        <p:txBody>
+          <a:bodyPr wrap="square" rtlCol="0">
+            <a:spAutoFit/>
+          </a:bodyPr>
+          <a:lstStyle/>
+          <a:p>
+            <a:pPr algn="ctr"/>
+            <a:r>
+              <a:rPr lang="en-US" dirty="0" smtClean="0"/>
+              <a:t>S7</a:t>
+            </a:r>
+            <a:endParaRPr lang="en-US" dirty="0"/>
+          </a:p>
+        </p:txBody>
+      </p:sp>
+      <p:sp>
+        <p:nvSpPr>
+          <p:cNvPr id="64" name="TextBox 63">
+            <a:extLst>
+              <a:ext uri="{FF2B5EF4-FFF2-40B4-BE49-F238E27FC236}">
+                <a16:creationId xmlns:a16="http://schemas.microsoft.com/office/drawing/2014/main" id="{161AB891-1A8A-46AB-8B66-527F5F79E84C}"/>
+              </a:ext>
+            </a:extLst>
+          </p:cNvPr>
+          <p:cNvSpPr txBox="1"/>
+          <p:nvPr/>
+        </p:nvSpPr>
+        <p:spPr>
+          <a:xfrm>
+            <a:off x="9665794" y="2390442"/>
+            <a:ext cx="1167618" cy="369332"/>
+          </a:xfrm>
+          <a:prstGeom prst="rect">
+            <a:avLst/>
+          </a:prstGeom>
+          <a:noFill/>
+        </p:spPr>
+        <p:txBody>
+          <a:bodyPr wrap="square" rtlCol="0">
+            <a:spAutoFit/>
+          </a:bodyPr>
+          <a:lstStyle/>
+          <a:p>
+            <a:pPr algn="ctr"/>
+            <a:r>
+              <a:rPr lang="en-US" dirty="0" smtClean="0"/>
+              <a:t>S8</a:t>
+            </a:r>
+            <a:endParaRPr lang="en-US" dirty="0"/>
+          </a:p>
+        </p:txBody>
+      </p:sp>
+      <p:sp>
+        <p:nvSpPr>
+          <p:cNvPr id="65" name="TextBox 64">
+            <a:extLst>
+              <a:ext uri="{FF2B5EF4-FFF2-40B4-BE49-F238E27FC236}">
+                <a16:creationId xmlns:a16="http://schemas.microsoft.com/office/drawing/2014/main" id="{161AB891-1A8A-46AB-8B66-527F5F79E84C}"/>
+              </a:ext>
+            </a:extLst>
+          </p:cNvPr>
+          <p:cNvSpPr txBox="1"/>
+          <p:nvPr/>
+        </p:nvSpPr>
+        <p:spPr>
+          <a:xfrm>
+            <a:off x="163654" y="3100892"/>
+            <a:ext cx="1167618" cy="369332"/>
+          </a:xfrm>
+          <a:prstGeom prst="rect">
+            <a:avLst/>
+          </a:prstGeom>
+          <a:noFill/>
+        </p:spPr>
+        <p:txBody>
+          <a:bodyPr wrap="square" rtlCol="0">
+            <a:spAutoFit/>
+          </a:bodyPr>
+          <a:lstStyle/>
+          <a:p>
+            <a:pPr algn="ctr"/>
+            <a:r>
+              <a:rPr lang="en-US" dirty="0" smtClean="0"/>
+              <a:t>S9</a:t>
+            </a:r>
+            <a:endParaRPr lang="en-US" dirty="0"/>
+          </a:p>
+        </p:txBody>
+      </p:sp>
     </p:spTree>
     <p:extLst>
       <p:ext uri="{BB962C8B-B14F-4D97-AF65-F5344CB8AC3E}">

</xml_diff>